<commit_message>
add let's start slide
</commit_message>
<xml_diff>
--- a/1.intro-to-python/intro-python.pptx
+++ b/1.intro-to-python/intro-python.pptx
@@ -12,10 +12,10 @@
     <p:sldId id="257" r:id="rId3"/>
     <p:sldId id="259" r:id="rId4"/>
     <p:sldId id="263" r:id="rId5"/>
-    <p:sldId id="260" r:id="rId6"/>
-    <p:sldId id="258" r:id="rId7"/>
-    <p:sldId id="261" r:id="rId8"/>
-    <p:sldId id="262" r:id="rId9"/>
+    <p:sldId id="258" r:id="rId6"/>
+    <p:sldId id="261" r:id="rId7"/>
+    <p:sldId id="262" r:id="rId8"/>
+    <p:sldId id="264" r:id="rId9"/>
   </p:sldIdLst>
   <p:sldSz cx="12192000" cy="6858000"/>
   <p:notesSz cx="6858000" cy="9144000"/>
@@ -125,7 +125,7 @@
 <file path=ppt/revisionInfo.xml><?xml version="1.0" encoding="utf-8"?>
 <p1510:revInfo xmlns:a="http://schemas.openxmlformats.org/drawingml/2006/main" xmlns:r="http://schemas.openxmlformats.org/officeDocument/2006/relationships" xmlns:p1510="http://schemas.microsoft.com/office/powerpoint/2015/10/main">
   <p1510:revLst>
-    <p1510:client id="{06E4B778-2CAB-4A23-A4A6-B4E3C67F9BA4}" v="14" dt="2020-03-06T12:32:43.299"/>
+    <p1510:client id="{06E4B778-2CAB-4A23-A4A6-B4E3C67F9BA4}" v="30" dt="2020-03-07T11:39:08.145"/>
   </p1510:revLst>
 </p1510:revInfo>
 </file>
@@ -257,8 +257,8 @@
   </pc:docChgLst>
   <pc:docChgLst>
     <pc:chgData name="Alex Marchioni" userId="6eb3c6d8-756f-4c94-a08e-610dca54a7e5" providerId="ADAL" clId="{06E4B778-2CAB-4A23-A4A6-B4E3C67F9BA4}"/>
-    <pc:docChg chg="undo custSel addSld modSld">
-      <pc:chgData name="Alex Marchioni" userId="6eb3c6d8-756f-4c94-a08e-610dca54a7e5" providerId="ADAL" clId="{06E4B778-2CAB-4A23-A4A6-B4E3C67F9BA4}" dt="2020-03-06T12:37:49.065" v="729" actId="20577"/>
+    <pc:docChg chg="undo custSel addSld delSld modSld">
+      <pc:chgData name="Alex Marchioni" userId="6eb3c6d8-756f-4c94-a08e-610dca54a7e5" providerId="ADAL" clId="{06E4B778-2CAB-4A23-A4A6-B4E3C67F9BA4}" dt="2020-03-07T11:37:59.726" v="1802" actId="20577"/>
       <pc:docMkLst>
         <pc:docMk/>
       </pc:docMkLst>
@@ -278,13 +278,13 @@
         </pc:spChg>
       </pc:sldChg>
       <pc:sldChg chg="modSp mod">
-        <pc:chgData name="Alex Marchioni" userId="6eb3c6d8-756f-4c94-a08e-610dca54a7e5" providerId="ADAL" clId="{06E4B778-2CAB-4A23-A4A6-B4E3C67F9BA4}" dt="2020-03-06T12:36:55.870" v="726" actId="20577"/>
+        <pc:chgData name="Alex Marchioni" userId="6eb3c6d8-756f-4c94-a08e-610dca54a7e5" providerId="ADAL" clId="{06E4B778-2CAB-4A23-A4A6-B4E3C67F9BA4}" dt="2020-03-07T11:37:59.726" v="1802" actId="20577"/>
         <pc:sldMkLst>
           <pc:docMk/>
           <pc:sldMk cId="3746852884" sldId="258"/>
         </pc:sldMkLst>
         <pc:spChg chg="mod">
-          <ac:chgData name="Alex Marchioni" userId="6eb3c6d8-756f-4c94-a08e-610dca54a7e5" providerId="ADAL" clId="{06E4B778-2CAB-4A23-A4A6-B4E3C67F9BA4}" dt="2020-03-06T12:36:55.870" v="726" actId="20577"/>
+          <ac:chgData name="Alex Marchioni" userId="6eb3c6d8-756f-4c94-a08e-610dca54a7e5" providerId="ADAL" clId="{06E4B778-2CAB-4A23-A4A6-B4E3C67F9BA4}" dt="2020-03-07T11:37:59.726" v="1802" actId="20577"/>
           <ac:spMkLst>
             <pc:docMk/>
             <pc:sldMk cId="3746852884" sldId="258"/>
@@ -304,6 +304,36 @@
             <pc:docMk/>
             <pc:sldMk cId="388191745" sldId="259"/>
             <ac:spMk id="3" creationId="{5D10EF7B-B28E-4063-BDE4-8CB437B1ED62}"/>
+          </ac:spMkLst>
+        </pc:spChg>
+      </pc:sldChg>
+      <pc:sldChg chg="del">
+        <pc:chgData name="Alex Marchioni" userId="6eb3c6d8-756f-4c94-a08e-610dca54a7e5" providerId="ADAL" clId="{06E4B778-2CAB-4A23-A4A6-B4E3C67F9BA4}" dt="2020-03-07T11:37:00.413" v="1775" actId="2696"/>
+        <pc:sldMkLst>
+          <pc:docMk/>
+          <pc:sldMk cId="3810145877" sldId="260"/>
+        </pc:sldMkLst>
+      </pc:sldChg>
+      <pc:sldChg chg="modSp mod">
+        <pc:chgData name="Alex Marchioni" userId="6eb3c6d8-756f-4c94-a08e-610dca54a7e5" providerId="ADAL" clId="{06E4B778-2CAB-4A23-A4A6-B4E3C67F9BA4}" dt="2020-03-07T11:19:34.495" v="852" actId="20577"/>
+        <pc:sldMkLst>
+          <pc:docMk/>
+          <pc:sldMk cId="873599404" sldId="261"/>
+        </pc:sldMkLst>
+        <pc:spChg chg="mod">
+          <ac:chgData name="Alex Marchioni" userId="6eb3c6d8-756f-4c94-a08e-610dca54a7e5" providerId="ADAL" clId="{06E4B778-2CAB-4A23-A4A6-B4E3C67F9BA4}" dt="2020-03-07T11:19:34.495" v="852" actId="20577"/>
+          <ac:spMkLst>
+            <pc:docMk/>
+            <pc:sldMk cId="873599404" sldId="261"/>
+            <ac:spMk id="2" creationId="{1602BB9E-1B11-4537-A039-97F7FC6254CA}"/>
+          </ac:spMkLst>
+        </pc:spChg>
+        <pc:spChg chg="mod">
+          <ac:chgData name="Alex Marchioni" userId="6eb3c6d8-756f-4c94-a08e-610dca54a7e5" providerId="ADAL" clId="{06E4B778-2CAB-4A23-A4A6-B4E3C67F9BA4}" dt="2020-03-07T11:18:49.647" v="847" actId="20577"/>
+          <ac:spMkLst>
+            <pc:docMk/>
+            <pc:sldMk cId="873599404" sldId="261"/>
+            <ac:spMk id="3" creationId="{AF691292-80E4-4571-BFA1-BA9452BCB5F6}"/>
           </ac:spMkLst>
         </pc:spChg>
       </pc:sldChg>
@@ -345,6 +375,29 @@
             <ac:picMk id="6" creationId="{A0CF62F7-0B9A-4D06-BFC8-EE9372E2DC8E}"/>
           </ac:picMkLst>
         </pc:picChg>
+      </pc:sldChg>
+      <pc:sldChg chg="modSp add mod">
+        <pc:chgData name="Alex Marchioni" userId="6eb3c6d8-756f-4c94-a08e-610dca54a7e5" providerId="ADAL" clId="{06E4B778-2CAB-4A23-A4A6-B4E3C67F9BA4}" dt="2020-03-07T11:36:38.614" v="1774" actId="20577"/>
+        <pc:sldMkLst>
+          <pc:docMk/>
+          <pc:sldMk cId="765582615" sldId="264"/>
+        </pc:sldMkLst>
+        <pc:spChg chg="mod">
+          <ac:chgData name="Alex Marchioni" userId="6eb3c6d8-756f-4c94-a08e-610dca54a7e5" providerId="ADAL" clId="{06E4B778-2CAB-4A23-A4A6-B4E3C67F9BA4}" dt="2020-03-07T11:20:26.431" v="884" actId="20577"/>
+          <ac:spMkLst>
+            <pc:docMk/>
+            <pc:sldMk cId="765582615" sldId="264"/>
+            <ac:spMk id="2" creationId="{70220312-B3A2-4906-ACD7-3816802806CE}"/>
+          </ac:spMkLst>
+        </pc:spChg>
+        <pc:spChg chg="mod">
+          <ac:chgData name="Alex Marchioni" userId="6eb3c6d8-756f-4c94-a08e-610dca54a7e5" providerId="ADAL" clId="{06E4B778-2CAB-4A23-A4A6-B4E3C67F9BA4}" dt="2020-03-07T11:36:38.614" v="1774" actId="20577"/>
+          <ac:spMkLst>
+            <pc:docMk/>
+            <pc:sldMk cId="765582615" sldId="264"/>
+            <ac:spMk id="3" creationId="{F6D4EED1-A828-499E-BED0-F178847FF734}"/>
+          </ac:spMkLst>
+        </pc:spChg>
       </pc:sldChg>
     </pc:docChg>
   </pc:docChgLst>
@@ -472,7 +525,7 @@
           <a:p>
             <a:fld id="{5123E9E2-7A5F-4CF3-8FCE-FEF7C5A345A2}" type="datetimeFigureOut">
               <a:rPr lang="en-GB" smtClean="0"/>
-              <a:t>06/03/2020</a:t>
+              <a:t>07/03/2020</a:t>
             </a:fld>
             <a:endParaRPr lang="en-GB"/>
           </a:p>
@@ -4144,47 +4197,47 @@
           <a:p>
             <a:r>
               <a:rPr lang="it-IT" dirty="0"/>
-              <a:t>		</a:t>
-            </a:r>
+              <a:t>		Python</a:t>
+            </a:r>
+            <a:endParaRPr lang="en-GB" dirty="0"/>
+          </a:p>
+        </p:txBody>
+      </p:sp>
+      <p:sp>
+        <p:nvSpPr>
+          <p:cNvPr id="3" name="Segnaposto contenuto 2">
+            <a:extLst>
+              <a:ext uri="{FF2B5EF4-FFF2-40B4-BE49-F238E27FC236}">
+                <a16:creationId xmlns:a16="http://schemas.microsoft.com/office/drawing/2014/main" id="{9EEA4250-C2F2-41B0-B170-8F1E0E901B0C}"/>
+              </a:ext>
+            </a:extLst>
+          </p:cNvPr>
+          <p:cNvSpPr>
+            <a:spLocks noGrp="1"/>
+          </p:cNvSpPr>
+          <p:nvPr>
+            <p:ph idx="1"/>
+          </p:nvPr>
+        </p:nvSpPr>
+        <p:spPr/>
+        <p:txBody>
+          <a:bodyPr>
+            <a:normAutofit lnSpcReduction="10000"/>
+          </a:bodyPr>
+          <a:lstStyle/>
+          <a:p>
+            <a:pPr marL="0" indent="0">
+              <a:buNone/>
+            </a:pPr>
             <a:r>
               <a:rPr lang="it-IT" dirty="0">
                 <a:hlinkClick r:id="rId2"/>
               </a:rPr>
               <a:t>Python</a:t>
             </a:r>
-            <a:endParaRPr lang="en-GB" dirty="0"/>
-          </a:p>
-        </p:txBody>
-      </p:sp>
-      <p:sp>
-        <p:nvSpPr>
-          <p:cNvPr id="3" name="Segnaposto contenuto 2">
-            <a:extLst>
-              <a:ext uri="{FF2B5EF4-FFF2-40B4-BE49-F238E27FC236}">
-                <a16:creationId xmlns:a16="http://schemas.microsoft.com/office/drawing/2014/main" id="{9EEA4250-C2F2-41B0-B170-8F1E0E901B0C}"/>
-              </a:ext>
-            </a:extLst>
-          </p:cNvPr>
-          <p:cNvSpPr>
-            <a:spLocks noGrp="1"/>
-          </p:cNvSpPr>
-          <p:nvPr>
-            <p:ph idx="1"/>
-          </p:nvPr>
-        </p:nvSpPr>
-        <p:spPr/>
-        <p:txBody>
-          <a:bodyPr>
-            <a:normAutofit lnSpcReduction="10000"/>
-          </a:bodyPr>
-          <a:lstStyle/>
-          <a:p>
-            <a:pPr marL="0" indent="0">
-              <a:buNone/>
-            </a:pPr>
             <a:r>
               <a:rPr lang="it-IT" dirty="0"/>
-              <a:t>Python </a:t>
+              <a:t> </a:t>
             </a:r>
             <a:r>
               <a:rPr lang="it-IT" dirty="0" err="1"/>
@@ -5062,7 +5115,7 @@
 </file>
 
 <file path=ppt/slides/slide5.xml><?xml version="1.0" encoding="utf-8"?>
-<p:sld xmlns:a="http://schemas.openxmlformats.org/drawingml/2006/main" xmlns:r="http://schemas.openxmlformats.org/officeDocument/2006/relationships" xmlns:p="http://schemas.openxmlformats.org/presentationml/2006/main" show="0">
+<p:sld xmlns:a="http://schemas.openxmlformats.org/drawingml/2006/main" xmlns:r="http://schemas.openxmlformats.org/officeDocument/2006/relationships" xmlns:p="http://schemas.openxmlformats.org/presentationml/2006/main">
   <p:cSld>
     <p:spTree>
       <p:nvGrpSpPr>
@@ -5083,7 +5136,7 @@
           <p:cNvPr id="2" name="Titolo 1">
             <a:extLst>
               <a:ext uri="{FF2B5EF4-FFF2-40B4-BE49-F238E27FC236}">
-                <a16:creationId xmlns:a16="http://schemas.microsoft.com/office/drawing/2014/main" id="{64312793-6B97-42CB-9FE2-16E4DC66D273}"/>
+                <a16:creationId xmlns:a16="http://schemas.microsoft.com/office/drawing/2014/main" id="{04BA1474-2A2A-415C-9C3C-FB96F61277AB}"/>
               </a:ext>
             </a:extLst>
           </p:cNvPr>
@@ -5100,115 +5153,94 @@
           <a:lstStyle/>
           <a:p>
             <a:r>
-              <a:rPr lang="en-GB" i="1" dirty="0"/>
-              <a:t>The </a:t>
-            </a:r>
-            <a:r>
-              <a:rPr lang="en-GB" i="1" dirty="0">
-                <a:hlinkClick r:id="rId2" tooltip="Zen of Python"/>
-              </a:rPr>
-              <a:t>Zen of Python</a:t>
-            </a:r>
+              <a:rPr lang="it-IT" dirty="0"/>
+              <a:t>Applications for Python</a:t>
+            </a:r>
+            <a:endParaRPr lang="en-GB" dirty="0"/>
+          </a:p>
+        </p:txBody>
+      </p:sp>
+      <p:sp>
+        <p:nvSpPr>
+          <p:cNvPr id="3" name="Segnaposto contenuto 2">
+            <a:extLst>
+              <a:ext uri="{FF2B5EF4-FFF2-40B4-BE49-F238E27FC236}">
+                <a16:creationId xmlns:a16="http://schemas.microsoft.com/office/drawing/2014/main" id="{AD36C959-3871-4520-9F21-43641332F8BF}"/>
+              </a:ext>
+            </a:extLst>
+          </p:cNvPr>
+          <p:cNvSpPr>
+            <a:spLocks noGrp="1"/>
+          </p:cNvSpPr>
+          <p:nvPr>
+            <p:ph idx="1"/>
+          </p:nvPr>
+        </p:nvSpPr>
+        <p:spPr/>
+        <p:txBody>
+          <a:bodyPr/>
+          <a:lstStyle/>
+          <a:p>
             <a:r>
               <a:rPr lang="en-GB" dirty="0"/>
-              <a:t> (</a:t>
-            </a:r>
-            <a:r>
-              <a:rPr lang="en-GB" i="1" dirty="0">
-                <a:hlinkClick r:id="rId3"/>
-              </a:rPr>
-              <a:t>PEP</a:t>
-            </a:r>
-            <a:r>
-              <a:rPr lang="en-GB" i="1" dirty="0"/>
-              <a:t> 20</a:t>
-            </a:r>
+              <a:t>Web and Internet Development </a:t>
+            </a:r>
+          </a:p>
+          <a:p>
             <a:r>
               <a:rPr lang="en-GB" dirty="0"/>
-              <a:t>)</a:t>
-            </a:r>
-          </a:p>
-        </p:txBody>
-      </p:sp>
-      <p:sp>
-        <p:nvSpPr>
-          <p:cNvPr id="3" name="Segnaposto contenuto 2">
-            <a:extLst>
-              <a:ext uri="{FF2B5EF4-FFF2-40B4-BE49-F238E27FC236}">
-                <a16:creationId xmlns:a16="http://schemas.microsoft.com/office/drawing/2014/main" id="{A5E6C686-71C9-43AF-BEA3-617CAE4AB38E}"/>
-              </a:ext>
-            </a:extLst>
-          </p:cNvPr>
-          <p:cNvSpPr>
-            <a:spLocks noGrp="1"/>
-          </p:cNvSpPr>
-          <p:nvPr>
-            <p:ph idx="1"/>
-          </p:nvPr>
-        </p:nvSpPr>
-        <p:spPr/>
-        <p:txBody>
-          <a:bodyPr/>
-          <a:lstStyle/>
+              <a:t>Scientific and Numeric</a:t>
+            </a:r>
+          </a:p>
           <a:p>
             <a:r>
               <a:rPr lang="en-GB" dirty="0"/>
-              <a:t>Beautiful is better than ugly</a:t>
+              <a:t>Education</a:t>
             </a:r>
           </a:p>
           <a:p>
             <a:r>
               <a:rPr lang="en-GB" dirty="0"/>
-              <a:t>Explicit is better than implicit</a:t>
+              <a:t>Desktop GUIs</a:t>
             </a:r>
           </a:p>
           <a:p>
             <a:r>
               <a:rPr lang="en-GB" dirty="0"/>
-              <a:t>Simple is better than complex</a:t>
+              <a:t>Software Development</a:t>
             </a:r>
           </a:p>
           <a:p>
             <a:r>
               <a:rPr lang="en-GB" dirty="0"/>
-              <a:t>Complex is better than complicated</a:t>
-            </a:r>
-          </a:p>
-          <a:p>
+              <a:t>Business Applications</a:t>
+            </a:r>
+          </a:p>
+          <a:p>
+            <a:endParaRPr lang="it-IT" u="sng" dirty="0"/>
+          </a:p>
+          <a:p>
+            <a:pPr marL="0" indent="0">
+              <a:buNone/>
+            </a:pPr>
+            <a:r>
+              <a:rPr lang="it-IT" dirty="0"/>
+              <a:t>Basically</a:t>
+            </a:r>
             <a:r>
               <a:rPr lang="en-GB" dirty="0"/>
-              <a:t>Readability counts</a:t>
-            </a:r>
-          </a:p>
-          <a:p>
-            <a:endParaRPr lang="it-IT" dirty="0"/>
-          </a:p>
-          <a:p>
-            <a:pPr marL="0" indent="0">
-              <a:buNone/>
-            </a:pPr>
-            <a:r>
-              <a:rPr lang="it-IT" dirty="0"/>
-              <a:t>P vs NP (… </a:t>
-            </a:r>
-            <a:r>
-              <a:rPr lang="it-IT" dirty="0" err="1"/>
-              <a:t>Pythonic</a:t>
-            </a:r>
-            <a:r>
-              <a:rPr lang="it-IT" dirty="0"/>
-              <a:t> vs Non-</a:t>
-            </a:r>
-            <a:r>
-              <a:rPr lang="it-IT" dirty="0" err="1"/>
-              <a:t>Pythonic</a:t>
-            </a:r>
-            <a:r>
-              <a:rPr lang="it-IT" dirty="0"/>
-              <a:t>)</a:t>
-            </a:r>
+              <a:t> anything, like English for spoken languages</a:t>
+            </a:r>
+          </a:p>
+          <a:p>
             <a:endParaRPr lang="en-GB" dirty="0"/>
           </a:p>
+          <a:p>
+            <a:endParaRPr lang="en-GB" dirty="0"/>
+          </a:p>
+          <a:p>
+            <a:endParaRPr lang="en-GB" dirty="0"/>
+          </a:p>
         </p:txBody>
       </p:sp>
       <p:sp>
@@ -5216,7 +5248,7 @@
           <p:cNvPr id="4" name="Segnaposto data 3">
             <a:extLst>
               <a:ext uri="{FF2B5EF4-FFF2-40B4-BE49-F238E27FC236}">
-                <a16:creationId xmlns:a16="http://schemas.microsoft.com/office/drawing/2014/main" id="{2734B00C-8FFE-4BC8-9BEB-CABC397F4ACC}"/>
+                <a16:creationId xmlns:a16="http://schemas.microsoft.com/office/drawing/2014/main" id="{BD555CF0-D36A-4578-9DB1-1DE62380CBEB}"/>
               </a:ext>
             </a:extLst>
           </p:cNvPr>
@@ -5245,7 +5277,7 @@
           <p:cNvPr id="5" name="Segnaposto numero diapositiva 4">
             <a:extLst>
               <a:ext uri="{FF2B5EF4-FFF2-40B4-BE49-F238E27FC236}">
-                <a16:creationId xmlns:a16="http://schemas.microsoft.com/office/drawing/2014/main" id="{1219D129-6B35-488E-8E16-11E614EC5ADD}"/>
+                <a16:creationId xmlns:a16="http://schemas.microsoft.com/office/drawing/2014/main" id="{00D9011F-2023-4C89-AF66-447320541EC8}"/>
               </a:ext>
             </a:extLst>
           </p:cNvPr>
@@ -5272,7 +5304,7 @@
     </p:spTree>
     <p:extLst>
       <p:ext uri="{BB962C8B-B14F-4D97-AF65-F5344CB8AC3E}">
-        <p14:creationId xmlns:p14="http://schemas.microsoft.com/office/powerpoint/2010/main" val="3810145877"/>
+        <p14:creationId xmlns:p14="http://schemas.microsoft.com/office/powerpoint/2010/main" val="3746852884"/>
       </p:ext>
     </p:extLst>
   </p:cSld>
@@ -5304,7 +5336,7 @@
           <p:cNvPr id="2" name="Titolo 1">
             <a:extLst>
               <a:ext uri="{FF2B5EF4-FFF2-40B4-BE49-F238E27FC236}">
-                <a16:creationId xmlns:a16="http://schemas.microsoft.com/office/drawing/2014/main" id="{04BA1474-2A2A-415C-9C3C-FB96F61277AB}"/>
+                <a16:creationId xmlns:a16="http://schemas.microsoft.com/office/drawing/2014/main" id="{1602BB9E-1B11-4537-A039-97F7FC6254CA}"/>
               </a:ext>
             </a:extLst>
           </p:cNvPr>
@@ -5322,7 +5354,7 @@
           <a:p>
             <a:r>
               <a:rPr lang="it-IT" dirty="0"/>
-              <a:t>Applications for Python</a:t>
+              <a:t>Scipy</a:t>
             </a:r>
             <a:endParaRPr lang="en-GB" dirty="0"/>
           </a:p>
@@ -5333,7 +5365,7 @@
           <p:cNvPr id="3" name="Segnaposto contenuto 2">
             <a:extLst>
               <a:ext uri="{FF2B5EF4-FFF2-40B4-BE49-F238E27FC236}">
-                <a16:creationId xmlns:a16="http://schemas.microsoft.com/office/drawing/2014/main" id="{AD36C959-3871-4520-9F21-43641332F8BF}"/>
+                <a16:creationId xmlns:a16="http://schemas.microsoft.com/office/drawing/2014/main" id="{AF691292-80E4-4571-BFA1-BA9452BCB5F6}"/>
               </a:ext>
             </a:extLst>
           </p:cNvPr>
@@ -5346,98 +5378,167 @@
         </p:nvSpPr>
         <p:spPr/>
         <p:txBody>
-          <a:bodyPr/>
-          <a:lstStyle/>
-          <a:p>
+          <a:bodyPr>
+            <a:normAutofit lnSpcReduction="10000"/>
+          </a:bodyPr>
+          <a:lstStyle/>
+          <a:p>
+            <a:pPr marL="0" indent="0">
+              <a:buNone/>
+            </a:pPr>
+            <a:r>
+              <a:rPr lang="it-IT" dirty="0">
+                <a:hlinkClick r:id="rId2"/>
+              </a:rPr>
+              <a:t>Scipy.org </a:t>
+            </a:r>
+            <a:r>
+              <a:rPr lang="it-IT" dirty="0"/>
+              <a:t>= </a:t>
+            </a:r>
             <a:r>
               <a:rPr lang="en-GB" dirty="0"/>
-              <a:t>Web and Internet Development </a:t>
-            </a:r>
-          </a:p>
-          <a:p>
+              <a:t> Python for math/science/engineering</a:t>
+            </a:r>
+          </a:p>
+          <a:p>
+            <a:r>
+              <a:rPr lang="it-IT" b="1" dirty="0"/>
+              <a:t>N</a:t>
+            </a:r>
+            <a:r>
+              <a:rPr lang="en-GB" b="1" dirty="0" err="1"/>
+              <a:t>umpy</a:t>
+            </a:r>
             <a:r>
               <a:rPr lang="en-GB" dirty="0"/>
-              <a:t>Scientific and Numeric</a:t>
-            </a:r>
-          </a:p>
-          <a:p>
+              <a:t>: Numerical Python package (inspired by </a:t>
+            </a:r>
+            <a:r>
+              <a:rPr lang="en-GB" dirty="0" err="1"/>
+              <a:t>Matlab</a:t>
+            </a:r>
             <a:r>
               <a:rPr lang="en-GB" dirty="0"/>
-              <a:t>Education</a:t>
-            </a:r>
-          </a:p>
-          <a:p>
+              <a:t>)</a:t>
+            </a:r>
+          </a:p>
+          <a:p>
+            <a:pPr marL="457200" lvl="1" indent="0">
+              <a:buNone/>
+            </a:pPr>
             <a:r>
               <a:rPr lang="en-GB" dirty="0"/>
-              <a:t>Desktop GUIs</a:t>
-            </a:r>
-          </a:p>
-          <a:p>
+              <a:t>N-dimensional array capabilities and some linear algebra, Fourier analysis, random number capabilities, etc.</a:t>
+            </a:r>
+          </a:p>
+          <a:p>
+            <a:r>
+              <a:rPr lang="it-IT" b="1" dirty="0" err="1"/>
+              <a:t>Scipy</a:t>
+            </a:r>
+            <a:r>
+              <a:rPr lang="it-IT" dirty="0"/>
+              <a:t>: </a:t>
+            </a:r>
             <a:r>
               <a:rPr lang="en-GB" dirty="0"/>
-              <a:t>Software Development</a:t>
-            </a:r>
-          </a:p>
-          <a:p>
+              <a:t>Scientific Python</a:t>
+            </a:r>
+          </a:p>
+          <a:p>
+            <a:pPr marL="457200" lvl="1" indent="0">
+              <a:buNone/>
+            </a:pPr>
             <a:r>
               <a:rPr lang="en-GB" dirty="0"/>
-              <a:t>Business Applications</a:t>
-            </a:r>
-          </a:p>
-          <a:p>
-            <a:endParaRPr lang="it-IT" u="sng" dirty="0"/>
-          </a:p>
-          <a:p>
-            <a:pPr marL="0" indent="0">
+              <a:t>For </a:t>
+            </a:r>
+            <a:r>
+              <a:rPr lang="en-GB" dirty="0" err="1"/>
+              <a:t>Matlab</a:t>
+            </a:r>
+            <a:r>
+              <a:rPr lang="en-GB" dirty="0"/>
+              <a:t> users, it's very much like many of the core toolboxes.</a:t>
+            </a:r>
+          </a:p>
+          <a:p>
+            <a:r>
+              <a:rPr lang="en-GB" b="1" dirty="0"/>
+              <a:t>Matplotlib: </a:t>
+            </a:r>
+            <a:r>
+              <a:rPr lang="en-GB" dirty="0"/>
+              <a:t> most popular data visualization package for Python</a:t>
+            </a:r>
+          </a:p>
+          <a:p>
+            <a:pPr marL="457200" lvl="1" indent="0">
               <a:buNone/>
             </a:pPr>
             <a:r>
-              <a:rPr lang="it-IT" dirty="0" err="1"/>
-              <a:t>Basically</a:t>
-            </a:r>
-            <a:r>
               <a:rPr lang="en-GB" dirty="0"/>
-              <a:t> everything -&gt; It’s becoming as English for spoken languages</a:t>
-            </a:r>
-          </a:p>
-          <a:p>
+              <a:t>Inspired by </a:t>
+            </a:r>
+            <a:r>
+              <a:rPr lang="en-GB" dirty="0" err="1"/>
+              <a:t>Matlab</a:t>
+            </a:r>
+            <a:r>
+              <a:rPr lang="en-GB" dirty="0"/>
+              <a:t> plots, but then it has evolved into something more.</a:t>
+            </a:r>
+          </a:p>
+          <a:p>
+            <a:r>
+              <a:rPr lang="en-GB" b="1" dirty="0"/>
+              <a:t>Pandas: </a:t>
+            </a:r>
+            <a:r>
+              <a:rPr lang="en-GB" dirty="0"/>
+              <a:t>Data Science Python</a:t>
+            </a:r>
+            <a:endParaRPr lang="en-GB" b="1" dirty="0"/>
+          </a:p>
+          <a:p>
+            <a:pPr marL="457200" lvl="1" indent="0">
+              <a:buNone/>
+            </a:pPr>
+            <a:r>
+              <a:rPr lang="en-GB" dirty="0"/>
+              <a:t>high-performance, easy-to-use data structures and data analysis tools</a:t>
+            </a:r>
+          </a:p>
+        </p:txBody>
+      </p:sp>
+      <p:sp>
+        <p:nvSpPr>
+          <p:cNvPr id="4" name="Segnaposto data 3">
+            <a:extLst>
+              <a:ext uri="{FF2B5EF4-FFF2-40B4-BE49-F238E27FC236}">
+                <a16:creationId xmlns:a16="http://schemas.microsoft.com/office/drawing/2014/main" id="{74219405-1A7A-4BD6-B580-8A1AECF25472}"/>
+              </a:ext>
+            </a:extLst>
+          </p:cNvPr>
+          <p:cNvSpPr>
+            <a:spLocks noGrp="1"/>
+          </p:cNvSpPr>
+          <p:nvPr>
+            <p:ph type="dt" sz="half" idx="10"/>
+          </p:nvPr>
+        </p:nvSpPr>
+        <p:spPr/>
+        <p:txBody>
+          <a:bodyPr/>
+          <a:lstStyle/>
+          <a:p>
+            <a:r>
+              <a:rPr lang="it-IT"/>
+              <a:t>09/03/2020</a:t>
+            </a:r>
             <a:endParaRPr lang="en-GB" dirty="0"/>
           </a:p>
-          <a:p>
-            <a:endParaRPr lang="en-GB" dirty="0"/>
-          </a:p>
-          <a:p>
-            <a:endParaRPr lang="en-GB" dirty="0"/>
-          </a:p>
-        </p:txBody>
-      </p:sp>
-      <p:sp>
-        <p:nvSpPr>
-          <p:cNvPr id="4" name="Segnaposto data 3">
-            <a:extLst>
-              <a:ext uri="{FF2B5EF4-FFF2-40B4-BE49-F238E27FC236}">
-                <a16:creationId xmlns:a16="http://schemas.microsoft.com/office/drawing/2014/main" id="{BD555CF0-D36A-4578-9DB1-1DE62380CBEB}"/>
-              </a:ext>
-            </a:extLst>
-          </p:cNvPr>
-          <p:cNvSpPr>
-            <a:spLocks noGrp="1"/>
-          </p:cNvSpPr>
-          <p:nvPr>
-            <p:ph type="dt" sz="half" idx="10"/>
-          </p:nvPr>
-        </p:nvSpPr>
-        <p:spPr/>
-        <p:txBody>
-          <a:bodyPr/>
-          <a:lstStyle/>
-          <a:p>
-            <a:r>
-              <a:rPr lang="it-IT"/>
-              <a:t>09/03/2020</a:t>
-            </a:r>
-            <a:endParaRPr lang="en-GB"/>
-          </a:p>
         </p:txBody>
       </p:sp>
       <p:sp>
@@ -5445,7 +5546,7 @@
           <p:cNvPr id="5" name="Segnaposto numero diapositiva 4">
             <a:extLst>
               <a:ext uri="{FF2B5EF4-FFF2-40B4-BE49-F238E27FC236}">
-                <a16:creationId xmlns:a16="http://schemas.microsoft.com/office/drawing/2014/main" id="{00D9011F-2023-4C89-AF66-447320541EC8}"/>
+                <a16:creationId xmlns:a16="http://schemas.microsoft.com/office/drawing/2014/main" id="{D96C1885-5855-47E7-8045-4AE58BE13713}"/>
               </a:ext>
             </a:extLst>
           </p:cNvPr>
@@ -5472,7 +5573,7 @@
     </p:spTree>
     <p:extLst>
       <p:ext uri="{BB962C8B-B14F-4D97-AF65-F5344CB8AC3E}">
-        <p14:creationId xmlns:p14="http://schemas.microsoft.com/office/powerpoint/2010/main" val="3746852884"/>
+        <p14:creationId xmlns:p14="http://schemas.microsoft.com/office/powerpoint/2010/main" val="873599404"/>
       </p:ext>
     </p:extLst>
   </p:cSld>
@@ -5504,7 +5605,7 @@
           <p:cNvPr id="2" name="Titolo 1">
             <a:extLst>
               <a:ext uri="{FF2B5EF4-FFF2-40B4-BE49-F238E27FC236}">
-                <a16:creationId xmlns:a16="http://schemas.microsoft.com/office/drawing/2014/main" id="{1602BB9E-1B11-4537-A039-97F7FC6254CA}"/>
+                <a16:creationId xmlns:a16="http://schemas.microsoft.com/office/drawing/2014/main" id="{5CC10A25-640A-4796-92CF-54333FA77309}"/>
               </a:ext>
             </a:extLst>
           </p:cNvPr>
@@ -5513,6 +5614,39 @@
           </p:cNvSpPr>
           <p:nvPr>
             <p:ph type="title"/>
+          </p:nvPr>
+        </p:nvSpPr>
+        <p:spPr/>
+        <p:txBody>
+          <a:bodyPr/>
+          <a:lstStyle/>
+          <a:p>
+            <a:r>
+              <a:rPr lang="en-GB" dirty="0"/>
+              <a:t>IPython &amp; </a:t>
+            </a:r>
+            <a:r>
+              <a:rPr lang="it-IT" dirty="0"/>
+              <a:t>Jupyter Notebook</a:t>
+            </a:r>
+            <a:endParaRPr lang="en-GB" dirty="0"/>
+          </a:p>
+        </p:txBody>
+      </p:sp>
+      <p:sp>
+        <p:nvSpPr>
+          <p:cNvPr id="3" name="Segnaposto contenuto 2">
+            <a:extLst>
+              <a:ext uri="{FF2B5EF4-FFF2-40B4-BE49-F238E27FC236}">
+                <a16:creationId xmlns:a16="http://schemas.microsoft.com/office/drawing/2014/main" id="{3654356C-06EB-46E1-8385-BA94BF1B862A}"/>
+              </a:ext>
+            </a:extLst>
+          </p:cNvPr>
+          <p:cNvSpPr>
+            <a:spLocks noGrp="1"/>
+          </p:cNvSpPr>
+          <p:nvPr>
+            <p:ph idx="1"/>
           </p:nvPr>
         </p:nvSpPr>
         <p:spPr/>
@@ -5524,151 +5658,116 @@
               <a:rPr lang="it-IT" dirty="0">
                 <a:hlinkClick r:id="rId2"/>
               </a:rPr>
-              <a:t>Scipy.org</a:t>
+              <a:t>Jupyter Notebook</a:t>
             </a:r>
             <a:r>
               <a:rPr lang="it-IT" dirty="0"/>
               <a:t> </a:t>
             </a:r>
+            <a:r>
+              <a:rPr lang="it-IT" dirty="0" err="1"/>
+              <a:t>is</a:t>
+            </a:r>
+            <a:r>
+              <a:rPr lang="it-IT" dirty="0"/>
+              <a:t> a web-</a:t>
+            </a:r>
+            <a:r>
+              <a:rPr lang="it-IT" dirty="0" err="1"/>
+              <a:t>based</a:t>
+            </a:r>
+            <a:r>
+              <a:rPr lang="it-IT" dirty="0"/>
+              <a:t> interactive </a:t>
+            </a:r>
+            <a:r>
+              <a:rPr lang="it-IT" dirty="0" err="1"/>
+              <a:t>computational</a:t>
+            </a:r>
+            <a:r>
+              <a:rPr lang="it-IT" dirty="0"/>
+              <a:t> </a:t>
+            </a:r>
+            <a:r>
+              <a:rPr lang="it-IT" dirty="0" err="1"/>
+              <a:t>environment</a:t>
+            </a:r>
+            <a:r>
+              <a:rPr lang="it-IT" dirty="0"/>
+              <a:t>, </a:t>
+            </a:r>
+            <a:r>
+              <a:rPr lang="it-IT" dirty="0" err="1"/>
+              <a:t>that</a:t>
+            </a:r>
+            <a:r>
+              <a:rPr lang="it-IT" dirty="0"/>
+              <a:t> supports </a:t>
+            </a:r>
+            <a:r>
+              <a:rPr lang="it-IT" dirty="0" err="1"/>
+              <a:t>different</a:t>
+            </a:r>
+            <a:r>
+              <a:rPr lang="it-IT" dirty="0"/>
+              <a:t> languages (Python, R, Julia, C++)</a:t>
+            </a:r>
+          </a:p>
+          <a:p>
+            <a:r>
+              <a:rPr lang="it-IT" dirty="0">
+                <a:hlinkClick r:id="rId3"/>
+              </a:rPr>
+              <a:t>IPython</a:t>
+            </a:r>
+            <a:r>
+              <a:rPr lang="it-IT" dirty="0"/>
+              <a:t> (Interactive Python) </a:t>
+            </a:r>
+            <a:r>
+              <a:rPr lang="it-IT" dirty="0" err="1"/>
+              <a:t>is</a:t>
+            </a:r>
+            <a:r>
+              <a:rPr lang="it-IT" dirty="0"/>
+              <a:t> the kernel </a:t>
+            </a:r>
+            <a:r>
+              <a:rPr lang="it-IT" dirty="0" err="1"/>
+              <a:t>that</a:t>
+            </a:r>
+            <a:r>
+              <a:rPr lang="it-IT" dirty="0"/>
+              <a:t> </a:t>
+            </a:r>
+            <a:r>
+              <a:rPr lang="it-IT" dirty="0" err="1"/>
+              <a:t>allows</a:t>
+            </a:r>
+            <a:r>
+              <a:rPr lang="it-IT" dirty="0"/>
+              <a:t> Python to be </a:t>
+            </a:r>
+            <a:r>
+              <a:rPr lang="it-IT" dirty="0" err="1"/>
+              <a:t>run</a:t>
+            </a:r>
+            <a:r>
+              <a:rPr lang="it-IT" dirty="0"/>
+              <a:t> on a Jupyter Notebook. </a:t>
+            </a:r>
+          </a:p>
+          <a:p>
             <a:endParaRPr lang="en-GB" dirty="0"/>
           </a:p>
         </p:txBody>
       </p:sp>
       <p:sp>
         <p:nvSpPr>
-          <p:cNvPr id="3" name="Segnaposto contenuto 2">
-            <a:extLst>
-              <a:ext uri="{FF2B5EF4-FFF2-40B4-BE49-F238E27FC236}">
-                <a16:creationId xmlns:a16="http://schemas.microsoft.com/office/drawing/2014/main" id="{AF691292-80E4-4571-BFA1-BA9452BCB5F6}"/>
-              </a:ext>
-            </a:extLst>
-          </p:cNvPr>
-          <p:cNvSpPr>
-            <a:spLocks noGrp="1"/>
-          </p:cNvSpPr>
-          <p:nvPr>
-            <p:ph idx="1"/>
-          </p:nvPr>
-        </p:nvSpPr>
-        <p:spPr/>
-        <p:txBody>
-          <a:bodyPr>
-            <a:normAutofit lnSpcReduction="10000"/>
-          </a:bodyPr>
-          <a:lstStyle/>
-          <a:p>
-            <a:pPr marL="0" indent="0">
-              <a:buNone/>
-            </a:pPr>
-            <a:r>
-              <a:rPr lang="it-IT" dirty="0"/>
-              <a:t>Scipy.org = </a:t>
-            </a:r>
-            <a:r>
-              <a:rPr lang="en-GB" dirty="0"/>
-              <a:t> Python for math/science/engineering</a:t>
-            </a:r>
-          </a:p>
-          <a:p>
-            <a:r>
-              <a:rPr lang="it-IT" b="1" dirty="0"/>
-              <a:t>N</a:t>
-            </a:r>
-            <a:r>
-              <a:rPr lang="en-GB" b="1" dirty="0" err="1"/>
-              <a:t>umpy</a:t>
-            </a:r>
-            <a:r>
-              <a:rPr lang="en-GB" dirty="0"/>
-              <a:t>: Numerical Python package (inspired by </a:t>
-            </a:r>
-            <a:r>
-              <a:rPr lang="en-GB" dirty="0" err="1"/>
-              <a:t>Matlab</a:t>
-            </a:r>
-            <a:r>
-              <a:rPr lang="en-GB" dirty="0"/>
-              <a:t>)</a:t>
-            </a:r>
-          </a:p>
-          <a:p>
-            <a:pPr marL="457200" lvl="1" indent="0">
-              <a:buNone/>
-            </a:pPr>
-            <a:r>
-              <a:rPr lang="en-GB" dirty="0"/>
-              <a:t>N-dimensional array capabilities and some linear algebra, Fourier analysis, random number capabilities, etc.</a:t>
-            </a:r>
-          </a:p>
-          <a:p>
-            <a:r>
-              <a:rPr lang="it-IT" b="1" dirty="0" err="1"/>
-              <a:t>Scipy</a:t>
-            </a:r>
-            <a:r>
-              <a:rPr lang="it-IT" dirty="0"/>
-              <a:t>: </a:t>
-            </a:r>
-            <a:r>
-              <a:rPr lang="en-GB" dirty="0"/>
-              <a:t>Scientific Python</a:t>
-            </a:r>
-          </a:p>
-          <a:p>
-            <a:pPr marL="457200" lvl="1" indent="0">
-              <a:buNone/>
-            </a:pPr>
-            <a:r>
-              <a:rPr lang="en-GB" dirty="0"/>
-              <a:t>For </a:t>
-            </a:r>
-            <a:r>
-              <a:rPr lang="en-GB" dirty="0" err="1"/>
-              <a:t>Matlab</a:t>
-            </a:r>
-            <a:r>
-              <a:rPr lang="en-GB" dirty="0"/>
-              <a:t> users, it's very much like many of the core toolboxes.</a:t>
-            </a:r>
-          </a:p>
-          <a:p>
-            <a:r>
-              <a:rPr lang="en-GB" b="1" dirty="0"/>
-              <a:t>Matplotlib: </a:t>
-            </a:r>
-            <a:r>
-              <a:rPr lang="en-GB" dirty="0"/>
-              <a:t> most popular plotting (data visualization) routine package for Python</a:t>
-            </a:r>
-          </a:p>
-          <a:p>
-            <a:r>
-              <a:rPr lang="en-GB" b="1" dirty="0"/>
-              <a:t>Pandas: </a:t>
-            </a:r>
-            <a:r>
-              <a:rPr lang="en-GB" dirty="0"/>
-              <a:t>Data Science Python</a:t>
-            </a:r>
-            <a:endParaRPr lang="en-GB" b="1" dirty="0"/>
-          </a:p>
-          <a:p>
-            <a:pPr marL="457200" lvl="1" indent="0">
-              <a:buNone/>
-            </a:pPr>
-            <a:r>
-              <a:rPr lang="en-GB" dirty="0"/>
-              <a:t>high-performance, easy-to-use data structures and data analysis tools</a:t>
-            </a:r>
-          </a:p>
-        </p:txBody>
-      </p:sp>
-      <p:sp>
-        <p:nvSpPr>
           <p:cNvPr id="4" name="Segnaposto data 3">
             <a:extLst>
               <a:ext uri="{FF2B5EF4-FFF2-40B4-BE49-F238E27FC236}">
-                <a16:creationId xmlns:a16="http://schemas.microsoft.com/office/drawing/2014/main" id="{74219405-1A7A-4BD6-B580-8A1AECF25472}"/>
+                <a16:creationId xmlns:a16="http://schemas.microsoft.com/office/drawing/2014/main" id="{12DB7C55-5CE5-4422-9685-9E215CBD335F}"/>
               </a:ext>
             </a:extLst>
           </p:cNvPr>
@@ -5688,7 +5787,7 @@
               <a:rPr lang="it-IT"/>
               <a:t>09/03/2020</a:t>
             </a:r>
-            <a:endParaRPr lang="en-GB" dirty="0"/>
+            <a:endParaRPr lang="en-GB"/>
           </a:p>
         </p:txBody>
       </p:sp>
@@ -5697,7 +5796,7 @@
           <p:cNvPr id="5" name="Segnaposto numero diapositiva 4">
             <a:extLst>
               <a:ext uri="{FF2B5EF4-FFF2-40B4-BE49-F238E27FC236}">
-                <a16:creationId xmlns:a16="http://schemas.microsoft.com/office/drawing/2014/main" id="{D96C1885-5855-47E7-8045-4AE58BE13713}"/>
+                <a16:creationId xmlns:a16="http://schemas.microsoft.com/office/drawing/2014/main" id="{6970C239-0365-417F-9661-68CDA7CAD96D}"/>
               </a:ext>
             </a:extLst>
           </p:cNvPr>
@@ -5724,7 +5823,7 @@
     </p:spTree>
     <p:extLst>
       <p:ext uri="{BB962C8B-B14F-4D97-AF65-F5344CB8AC3E}">
-        <p14:creationId xmlns:p14="http://schemas.microsoft.com/office/powerpoint/2010/main" val="873599404"/>
+        <p14:creationId xmlns:p14="http://schemas.microsoft.com/office/powerpoint/2010/main" val="2426077806"/>
       </p:ext>
     </p:extLst>
   </p:cSld>
@@ -5753,10 +5852,10 @@
       </p:grpSpPr>
       <p:sp>
         <p:nvSpPr>
-          <p:cNvPr id="2" name="Titolo 1">
-            <a:extLst>
-              <a:ext uri="{FF2B5EF4-FFF2-40B4-BE49-F238E27FC236}">
-                <a16:creationId xmlns:a16="http://schemas.microsoft.com/office/drawing/2014/main" id="{5CC10A25-640A-4796-92CF-54333FA77309}"/>
+          <p:cNvPr id="2" name="Title 1">
+            <a:extLst>
+              <a:ext uri="{FF2B5EF4-FFF2-40B4-BE49-F238E27FC236}">
+                <a16:creationId xmlns:a16="http://schemas.microsoft.com/office/drawing/2014/main" id="{70220312-B3A2-4906-ACD7-3816802806CE}"/>
               </a:ext>
             </a:extLst>
           </p:cNvPr>
@@ -5773,23 +5872,18 @@
           <a:lstStyle/>
           <a:p>
             <a:r>
-              <a:rPr lang="en-GB" dirty="0"/>
-              <a:t>IPython &amp; </a:t>
-            </a:r>
-            <a:r>
               <a:rPr lang="it-IT" dirty="0"/>
-              <a:t>Jupyter Notebook</a:t>
-            </a:r>
-            <a:endParaRPr lang="en-GB" dirty="0"/>
-          </a:p>
-        </p:txBody>
-      </p:sp>
-      <p:sp>
-        <p:nvSpPr>
-          <p:cNvPr id="3" name="Segnaposto contenuto 2">
-            <a:extLst>
-              <a:ext uri="{FF2B5EF4-FFF2-40B4-BE49-F238E27FC236}">
-                <a16:creationId xmlns:a16="http://schemas.microsoft.com/office/drawing/2014/main" id="{3654356C-06EB-46E1-8385-BA94BF1B862A}"/>
+              <a:t>Let’s start</a:t>
+            </a:r>
+          </a:p>
+        </p:txBody>
+      </p:sp>
+      <p:sp>
+        <p:nvSpPr>
+          <p:cNvPr id="3" name="Content Placeholder 2">
+            <a:extLst>
+              <a:ext uri="{FF2B5EF4-FFF2-40B4-BE49-F238E27FC236}">
+                <a16:creationId xmlns:a16="http://schemas.microsoft.com/office/drawing/2014/main" id="{F6D4EED1-A828-499E-BED0-F178847FF734}"/>
               </a:ext>
             </a:extLst>
           </p:cNvPr>
@@ -5805,149 +5899,107 @@
           <a:bodyPr/>
           <a:lstStyle/>
           <a:p>
+            <a:pPr marL="0" indent="0">
+              <a:buNone/>
+            </a:pPr>
+            <a:r>
+              <a:rPr lang="it-IT" dirty="0"/>
+              <a:t>We will get start with a short tutorial on Python.</a:t>
+            </a:r>
+          </a:p>
+          <a:p>
+            <a:r>
+              <a:rPr lang="it-IT" dirty="0"/>
+              <a:t>Clone/download this repository:</a:t>
+            </a:r>
+            <a:br>
+              <a:rPr lang="it-IT" dirty="0"/>
+            </a:br>
             <a:r>
               <a:rPr lang="it-IT" dirty="0">
                 <a:hlinkClick r:id="rId2"/>
               </a:rPr>
-              <a:t>Jupyter Notebook</a:t>
-            </a:r>
+              <a:t>https://github.com/marchioa/data-security</a:t>
+            </a:r>
+            <a:endParaRPr lang="it-IT" dirty="0"/>
+          </a:p>
+          <a:p>
             <a:r>
               <a:rPr lang="it-IT" dirty="0"/>
-              <a:t> </a:t>
-            </a:r>
-            <a:r>
-              <a:rPr lang="it-IT" dirty="0" err="1"/>
-              <a:t>is</a:t>
+              <a:t>There, in the folder </a:t>
+            </a:r>
+            <a:r>
+              <a:rPr lang="it-IT" i="1" dirty="0"/>
+              <a:t>1.intro-to-python</a:t>
             </a:r>
             <a:r>
               <a:rPr lang="it-IT" dirty="0"/>
-              <a:t> a web-</a:t>
-            </a:r>
-            <a:r>
-              <a:rPr lang="it-IT" dirty="0" err="1"/>
-              <a:t>based</a:t>
-            </a:r>
-            <a:r>
-              <a:rPr lang="it-IT" dirty="0"/>
-              <a:t> interactive </a:t>
-            </a:r>
-            <a:r>
-              <a:rPr lang="it-IT" dirty="0" err="1"/>
-              <a:t>computational</a:t>
-            </a:r>
-            <a:r>
-              <a:rPr lang="it-IT" dirty="0"/>
-              <a:t> </a:t>
-            </a:r>
-            <a:r>
-              <a:rPr lang="it-IT" dirty="0" err="1"/>
-              <a:t>environment</a:t>
-            </a:r>
-            <a:r>
-              <a:rPr lang="it-IT" dirty="0"/>
-              <a:t>, </a:t>
-            </a:r>
-            <a:r>
-              <a:rPr lang="it-IT" dirty="0" err="1"/>
-              <a:t>that</a:t>
-            </a:r>
-            <a:r>
-              <a:rPr lang="it-IT" dirty="0"/>
-              <a:t> supports </a:t>
-            </a:r>
-            <a:r>
-              <a:rPr lang="it-IT" dirty="0" err="1"/>
-              <a:t>different</a:t>
-            </a:r>
-            <a:r>
-              <a:rPr lang="it-IT" dirty="0"/>
-              <a:t> languages (Python, R, Julia, C++)</a:t>
-            </a:r>
-          </a:p>
-          <a:p>
+              <a:t> the file </a:t>
+            </a:r>
             <a:r>
               <a:rPr lang="it-IT" dirty="0">
                 <a:hlinkClick r:id="rId3"/>
               </a:rPr>
-              <a:t>IPython</a:t>
+              <a:t>enviroment_setup.md</a:t>
             </a:r>
             <a:r>
               <a:rPr lang="it-IT" dirty="0"/>
-              <a:t> (Interactive Python) </a:t>
-            </a:r>
-            <a:r>
-              <a:rPr lang="it-IT" dirty="0" err="1"/>
-              <a:t>is</a:t>
-            </a:r>
+              <a:t> lists all the instructions to set up the environment we will work on. </a:t>
+            </a:r>
+          </a:p>
+          <a:p>
             <a:r>
               <a:rPr lang="it-IT" dirty="0"/>
-              <a:t> the kernel </a:t>
-            </a:r>
-            <a:r>
-              <a:rPr lang="it-IT" dirty="0" err="1"/>
-              <a:t>that</a:t>
+              <a:t>Once the environment is ready and Jupyter has started you can start opening the notebooks (.ipynb files) composing the tutorial. With great imagination, </a:t>
+            </a:r>
+            <a:r>
+              <a:rPr lang="it-IT" dirty="0">
+                <a:hlinkClick r:id="rId4"/>
+              </a:rPr>
+              <a:t>1.LETS_START.ipynb</a:t>
             </a:r>
             <a:r>
               <a:rPr lang="it-IT" dirty="0"/>
-              <a:t> </a:t>
-            </a:r>
-            <a:r>
-              <a:rPr lang="it-IT" dirty="0" err="1"/>
-              <a:t>allows</a:t>
-            </a:r>
-            <a:r>
-              <a:rPr lang="it-IT" dirty="0"/>
-              <a:t> Python to be </a:t>
-            </a:r>
-            <a:r>
-              <a:rPr lang="it-IT" dirty="0" err="1"/>
-              <a:t>run</a:t>
-            </a:r>
-            <a:r>
-              <a:rPr lang="it-IT" dirty="0"/>
-              <a:t> on a Jupyter Notebook. </a:t>
-            </a:r>
-          </a:p>
-          <a:p>
+              <a:t> is the first one.</a:t>
+            </a:r>
+          </a:p>
+        </p:txBody>
+      </p:sp>
+      <p:sp>
+        <p:nvSpPr>
+          <p:cNvPr id="4" name="Date Placeholder 3">
+            <a:extLst>
+              <a:ext uri="{FF2B5EF4-FFF2-40B4-BE49-F238E27FC236}">
+                <a16:creationId xmlns:a16="http://schemas.microsoft.com/office/drawing/2014/main" id="{83918897-6A3A-498C-8E6F-DB8E95C66AB4}"/>
+              </a:ext>
+            </a:extLst>
+          </p:cNvPr>
+          <p:cNvSpPr>
+            <a:spLocks noGrp="1"/>
+          </p:cNvSpPr>
+          <p:nvPr>
+            <p:ph type="dt" sz="half" idx="10"/>
+          </p:nvPr>
+        </p:nvSpPr>
+        <p:spPr/>
+        <p:txBody>
+          <a:bodyPr/>
+          <a:lstStyle/>
+          <a:p>
+            <a:r>
+              <a:rPr lang="it-IT"/>
+              <a:t>09/03/2020</a:t>
+            </a:r>
             <a:endParaRPr lang="en-GB" dirty="0"/>
           </a:p>
         </p:txBody>
       </p:sp>
       <p:sp>
         <p:nvSpPr>
-          <p:cNvPr id="4" name="Segnaposto data 3">
-            <a:extLst>
-              <a:ext uri="{FF2B5EF4-FFF2-40B4-BE49-F238E27FC236}">
-                <a16:creationId xmlns:a16="http://schemas.microsoft.com/office/drawing/2014/main" id="{12DB7C55-5CE5-4422-9685-9E215CBD335F}"/>
-              </a:ext>
-            </a:extLst>
-          </p:cNvPr>
-          <p:cNvSpPr>
-            <a:spLocks noGrp="1"/>
-          </p:cNvSpPr>
-          <p:nvPr>
-            <p:ph type="dt" sz="half" idx="10"/>
-          </p:nvPr>
-        </p:nvSpPr>
-        <p:spPr/>
-        <p:txBody>
-          <a:bodyPr/>
-          <a:lstStyle/>
-          <a:p>
-            <a:r>
-              <a:rPr lang="it-IT"/>
-              <a:t>09/03/2020</a:t>
-            </a:r>
-            <a:endParaRPr lang="en-GB"/>
-          </a:p>
-        </p:txBody>
-      </p:sp>
-      <p:sp>
-        <p:nvSpPr>
-          <p:cNvPr id="5" name="Segnaposto numero diapositiva 4">
-            <a:extLst>
-              <a:ext uri="{FF2B5EF4-FFF2-40B4-BE49-F238E27FC236}">
-                <a16:creationId xmlns:a16="http://schemas.microsoft.com/office/drawing/2014/main" id="{6970C239-0365-417F-9661-68CDA7CAD96D}"/>
+          <p:cNvPr id="5" name="Slide Number Placeholder 4">
+            <a:extLst>
+              <a:ext uri="{FF2B5EF4-FFF2-40B4-BE49-F238E27FC236}">
+                <a16:creationId xmlns:a16="http://schemas.microsoft.com/office/drawing/2014/main" id="{A2E9F542-D0F1-4F03-AF88-32B2211AFE9C}"/>
               </a:ext>
             </a:extLst>
           </p:cNvPr>
@@ -5974,7 +6026,7 @@
     </p:spTree>
     <p:extLst>
       <p:ext uri="{BB962C8B-B14F-4D97-AF65-F5344CB8AC3E}">
-        <p14:creationId xmlns:p14="http://schemas.microsoft.com/office/powerpoint/2010/main" val="2426077806"/>
+        <p14:creationId xmlns:p14="http://schemas.microsoft.com/office/powerpoint/2010/main" val="765582615"/>
       </p:ext>
     </p:extLst>
   </p:cSld>

</xml_diff>